<commit_message>
Working on Write Up and Visualisations
</commit_message>
<xml_diff>
--- a/docs/Architectures.pptx
+++ b/docs/Architectures.pptx
@@ -5,11 +5,12 @@
     <p:sldMasterId id="2147483648" r:id="rId1"/>
   </p:sldMasterIdLst>
   <p:notesMasterIdLst>
-    <p:notesMasterId r:id="rId4"/>
+    <p:notesMasterId r:id="rId5"/>
   </p:notesMasterIdLst>
   <p:sldIdLst>
     <p:sldId id="256" r:id="rId2"/>
     <p:sldId id="257" r:id="rId3"/>
+    <p:sldId id="258" r:id="rId4"/>
   </p:sldIdLst>
   <p:sldSz cx="12192000" cy="6858000"/>
   <p:notesSz cx="6858000" cy="9144000"/>
@@ -198,7 +199,7 @@
           <a:p>
             <a:fld id="{692584DF-C865-4592-8ED7-B1F61CF9BAAD}" type="datetimeFigureOut">
               <a:rPr lang="en-GB" smtClean="0"/>
-              <a:t>07/08/2023</a:t>
+              <a:t>10/08/2023</a:t>
             </a:fld>
             <a:endParaRPr lang="en-GB"/>
           </a:p>
@@ -615,7 +616,7 @@
           <a:p>
             <a:fld id="{F329D50C-4BB7-4A90-83D6-4F26E5B1EE76}" type="datetimeFigureOut">
               <a:rPr lang="en-GB" smtClean="0"/>
-              <a:t>07/08/2023</a:t>
+              <a:t>10/08/2023</a:t>
             </a:fld>
             <a:endParaRPr lang="en-GB"/>
           </a:p>
@@ -815,7 +816,7 @@
           <a:p>
             <a:fld id="{F329D50C-4BB7-4A90-83D6-4F26E5B1EE76}" type="datetimeFigureOut">
               <a:rPr lang="en-GB" smtClean="0"/>
-              <a:t>07/08/2023</a:t>
+              <a:t>10/08/2023</a:t>
             </a:fld>
             <a:endParaRPr lang="en-GB"/>
           </a:p>
@@ -1025,7 +1026,7 @@
           <a:p>
             <a:fld id="{F329D50C-4BB7-4A90-83D6-4F26E5B1EE76}" type="datetimeFigureOut">
               <a:rPr lang="en-GB" smtClean="0"/>
-              <a:t>07/08/2023</a:t>
+              <a:t>10/08/2023</a:t>
             </a:fld>
             <a:endParaRPr lang="en-GB"/>
           </a:p>
@@ -1225,7 +1226,7 @@
           <a:p>
             <a:fld id="{F329D50C-4BB7-4A90-83D6-4F26E5B1EE76}" type="datetimeFigureOut">
               <a:rPr lang="en-GB" smtClean="0"/>
-              <a:t>07/08/2023</a:t>
+              <a:t>10/08/2023</a:t>
             </a:fld>
             <a:endParaRPr lang="en-GB"/>
           </a:p>
@@ -1501,7 +1502,7 @@
           <a:p>
             <a:fld id="{F329D50C-4BB7-4A90-83D6-4F26E5B1EE76}" type="datetimeFigureOut">
               <a:rPr lang="en-GB" smtClean="0"/>
-              <a:t>07/08/2023</a:t>
+              <a:t>10/08/2023</a:t>
             </a:fld>
             <a:endParaRPr lang="en-GB"/>
           </a:p>
@@ -1769,7 +1770,7 @@
           <a:p>
             <a:fld id="{F329D50C-4BB7-4A90-83D6-4F26E5B1EE76}" type="datetimeFigureOut">
               <a:rPr lang="en-GB" smtClean="0"/>
-              <a:t>07/08/2023</a:t>
+              <a:t>10/08/2023</a:t>
             </a:fld>
             <a:endParaRPr lang="en-GB"/>
           </a:p>
@@ -2184,7 +2185,7 @@
           <a:p>
             <a:fld id="{F329D50C-4BB7-4A90-83D6-4F26E5B1EE76}" type="datetimeFigureOut">
               <a:rPr lang="en-GB" smtClean="0"/>
-              <a:t>07/08/2023</a:t>
+              <a:t>10/08/2023</a:t>
             </a:fld>
             <a:endParaRPr lang="en-GB"/>
           </a:p>
@@ -2326,7 +2327,7 @@
           <a:p>
             <a:fld id="{F329D50C-4BB7-4A90-83D6-4F26E5B1EE76}" type="datetimeFigureOut">
               <a:rPr lang="en-GB" smtClean="0"/>
-              <a:t>07/08/2023</a:t>
+              <a:t>10/08/2023</a:t>
             </a:fld>
             <a:endParaRPr lang="en-GB"/>
           </a:p>
@@ -2439,7 +2440,7 @@
           <a:p>
             <a:fld id="{F329D50C-4BB7-4A90-83D6-4F26E5B1EE76}" type="datetimeFigureOut">
               <a:rPr lang="en-GB" smtClean="0"/>
-              <a:t>07/08/2023</a:t>
+              <a:t>10/08/2023</a:t>
             </a:fld>
             <a:endParaRPr lang="en-GB"/>
           </a:p>
@@ -2752,7 +2753,7 @@
           <a:p>
             <a:fld id="{F329D50C-4BB7-4A90-83D6-4F26E5B1EE76}" type="datetimeFigureOut">
               <a:rPr lang="en-GB" smtClean="0"/>
-              <a:t>07/08/2023</a:t>
+              <a:t>10/08/2023</a:t>
             </a:fld>
             <a:endParaRPr lang="en-GB"/>
           </a:p>
@@ -3041,7 +3042,7 @@
           <a:p>
             <a:fld id="{F329D50C-4BB7-4A90-83D6-4F26E5B1EE76}" type="datetimeFigureOut">
               <a:rPr lang="en-GB" smtClean="0"/>
-              <a:t>07/08/2023</a:t>
+              <a:t>10/08/2023</a:t>
             </a:fld>
             <a:endParaRPr lang="en-GB"/>
           </a:p>
@@ -3284,7 +3285,7 @@
           <a:p>
             <a:fld id="{F329D50C-4BB7-4A90-83D6-4F26E5B1EE76}" type="datetimeFigureOut">
               <a:rPr lang="en-GB" smtClean="0"/>
-              <a:t>07/08/2023</a:t>
+              <a:t>10/08/2023</a:t>
             </a:fld>
             <a:endParaRPr lang="en-GB"/>
           </a:p>
@@ -5406,16 +5407,6 @@
           <a:p>
             <a:pPr algn="ctr"/>
             <a:r>
-              <a:rPr lang="en-GB" sz="1100" b="1" i="0" dirty="0" err="1">
-                <a:solidFill>
-                  <a:schemeClr val="bg1"/>
-                </a:solidFill>
-                <a:effectLst/>
-                <a:latin typeface="Palatino Linotype" panose="02040502050505030304" pitchFamily="18" charset="0"/>
-              </a:rPr>
-              <a:t>ChemBERTa</a:t>
-            </a:r>
-            <a:r>
               <a:rPr lang="en-GB" sz="1100" b="1" i="0" dirty="0">
                 <a:solidFill>
                   <a:schemeClr val="bg1"/>
@@ -5423,7 +5414,7 @@
                 <a:effectLst/>
                 <a:latin typeface="Palatino Linotype" panose="02040502050505030304" pitchFamily="18" charset="0"/>
               </a:rPr>
-              <a:t> Model</a:t>
+              <a:t>ChemBERTa Model</a:t>
             </a:r>
             <a:endParaRPr lang="en-GB" sz="1100" b="1" dirty="0">
               <a:solidFill>
@@ -5656,7 +5647,7 @@
         </p:blipFill>
         <p:spPr>
           <a:xfrm>
-            <a:off x="5647978" y="647003"/>
+            <a:off x="5624267" y="643795"/>
             <a:ext cx="697114" cy="1261864"/>
           </a:xfrm>
           <a:prstGeom prst="rect">
@@ -6333,12 +6324,217 @@
           </a:p>
         </p:txBody>
       </p:sp>
+      <p:grpSp>
+        <p:nvGrpSpPr>
+          <p:cNvPr id="4" name="Group 3">
+            <a:extLst>
+              <a:ext uri="{FF2B5EF4-FFF2-40B4-BE49-F238E27FC236}">
+                <a16:creationId xmlns:a16="http://schemas.microsoft.com/office/drawing/2014/main" id="{B490E854-82CD-F651-1BEC-9E2E4605DB12}"/>
+              </a:ext>
+            </a:extLst>
+          </p:cNvPr>
+          <p:cNvGrpSpPr/>
+          <p:nvPr/>
+        </p:nvGrpSpPr>
+        <p:grpSpPr>
+          <a:xfrm>
+            <a:off x="7464074" y="1221165"/>
+            <a:ext cx="1285336" cy="656212"/>
+            <a:chOff x="1537562" y="4786706"/>
+            <a:chExt cx="1285336" cy="656212"/>
+          </a:xfrm>
+        </p:grpSpPr>
+        <p:sp>
+          <p:nvSpPr>
+            <p:cNvPr id="2" name="Rectangle: Rounded Corners 1">
+              <a:extLst>
+                <a:ext uri="{FF2B5EF4-FFF2-40B4-BE49-F238E27FC236}">
+                  <a16:creationId xmlns:a16="http://schemas.microsoft.com/office/drawing/2014/main" id="{A97FDB14-1787-3D19-4AC2-6E530E42FF52}"/>
+                </a:ext>
+              </a:extLst>
+            </p:cNvPr>
+            <p:cNvSpPr/>
+            <p:nvPr/>
+          </p:nvSpPr>
+          <p:spPr>
+            <a:xfrm>
+              <a:off x="1537562" y="4786706"/>
+              <a:ext cx="1285335" cy="656212"/>
+            </a:xfrm>
+            <a:prstGeom prst="roundRect">
+              <a:avLst/>
+            </a:prstGeom>
+            <a:solidFill>
+              <a:schemeClr val="tx1"/>
+            </a:solidFill>
+            <a:ln>
+              <a:noFill/>
+            </a:ln>
+          </p:spPr>
+          <p:style>
+            <a:lnRef idx="2">
+              <a:schemeClr val="accent1">
+                <a:shade val="15000"/>
+              </a:schemeClr>
+            </a:lnRef>
+            <a:fillRef idx="1">
+              <a:schemeClr val="accent1"/>
+            </a:fillRef>
+            <a:effectRef idx="0">
+              <a:schemeClr val="accent1"/>
+            </a:effectRef>
+            <a:fontRef idx="minor">
+              <a:schemeClr val="lt1"/>
+            </a:fontRef>
+          </p:style>
+          <p:txBody>
+            <a:bodyPr rtlCol="0" anchor="ctr"/>
+            <a:lstStyle/>
+            <a:p>
+              <a:pPr algn="ctr"/>
+              <a:endParaRPr lang="en-GB"/>
+            </a:p>
+          </p:txBody>
+        </p:sp>
+        <p:sp>
+          <p:nvSpPr>
+            <p:cNvPr id="3" name="TextBox 2">
+              <a:extLst>
+                <a:ext uri="{FF2B5EF4-FFF2-40B4-BE49-F238E27FC236}">
+                  <a16:creationId xmlns:a16="http://schemas.microsoft.com/office/drawing/2014/main" id="{EFB79DD2-D975-82E9-534A-89790724E3B0}"/>
+                </a:ext>
+              </a:extLst>
+            </p:cNvPr>
+            <p:cNvSpPr txBox="1"/>
+            <p:nvPr/>
+          </p:nvSpPr>
+          <p:spPr>
+            <a:xfrm>
+              <a:off x="1537562" y="4911866"/>
+              <a:ext cx="1285336" cy="430887"/>
+            </a:xfrm>
+            <a:prstGeom prst="rect">
+              <a:avLst/>
+            </a:prstGeom>
+            <a:noFill/>
+          </p:spPr>
+          <p:txBody>
+            <a:bodyPr wrap="square">
+              <a:spAutoFit/>
+            </a:bodyPr>
+            <a:lstStyle/>
+            <a:p>
+              <a:pPr algn="ctr"/>
+              <a:r>
+                <a:rPr lang="en-GB" sz="1100" b="1" i="0" dirty="0">
+                  <a:solidFill>
+                    <a:schemeClr val="bg1"/>
+                  </a:solidFill>
+                  <a:effectLst/>
+                  <a:latin typeface="Palatino Linotype" panose="02040502050505030304" pitchFamily="18" charset="0"/>
+                </a:rPr>
+                <a:t>ChemBERTa Model</a:t>
+              </a:r>
+              <a:endParaRPr lang="en-GB" sz="1100" b="1" dirty="0">
+                <a:solidFill>
+                  <a:schemeClr val="bg1"/>
+                </a:solidFill>
+                <a:latin typeface="Palatino Linotype" panose="02040502050505030304" pitchFamily="18" charset="0"/>
+              </a:endParaRPr>
+            </a:p>
+          </p:txBody>
+        </p:sp>
+      </p:grpSp>
+    </p:spTree>
+    <p:extLst>
+      <p:ext uri="{BB962C8B-B14F-4D97-AF65-F5344CB8AC3E}">
+        <p14:creationId xmlns:p14="http://schemas.microsoft.com/office/powerpoint/2010/main" val="1175631114"/>
+      </p:ext>
+    </p:extLst>
+  </p:cSld>
+  <p:clrMapOvr>
+    <a:masterClrMapping/>
+  </p:clrMapOvr>
+</p:sld>
+</file>
+
+<file path=ppt/slides/slide3.xml><?xml version="1.0" encoding="utf-8"?>
+<p:sld xmlns:a="http://schemas.openxmlformats.org/drawingml/2006/main" xmlns:r="http://schemas.openxmlformats.org/officeDocument/2006/relationships" xmlns:p="http://schemas.openxmlformats.org/presentationml/2006/main">
+  <p:cSld>
+    <p:spTree>
+      <p:nvGrpSpPr>
+        <p:cNvPr id="1" name=""/>
+        <p:cNvGrpSpPr/>
+        <p:nvPr/>
+      </p:nvGrpSpPr>
+      <p:grpSpPr>
+        <a:xfrm>
+          <a:off x="0" y="0"/>
+          <a:ext cx="0" cy="0"/>
+          <a:chOff x="0" y="0"/>
+          <a:chExt cx="0" cy="0"/>
+        </a:xfrm>
+      </p:grpSpPr>
+      <p:sp>
+        <p:nvSpPr>
+          <p:cNvPr id="23" name="Rectangle: Rounded Corners 22">
+            <a:extLst>
+              <a:ext uri="{FF2B5EF4-FFF2-40B4-BE49-F238E27FC236}">
+                <a16:creationId xmlns:a16="http://schemas.microsoft.com/office/drawing/2014/main" id="{1C402C8F-AF0C-91E4-0D6D-1CE79EE1D347}"/>
+              </a:ext>
+            </a:extLst>
+          </p:cNvPr>
+          <p:cNvSpPr/>
+          <p:nvPr/>
+        </p:nvSpPr>
+        <p:spPr>
+          <a:xfrm>
+            <a:off x="230819" y="1576624"/>
+            <a:ext cx="11597625" cy="2751437"/>
+          </a:xfrm>
+          <a:prstGeom prst="roundRect">
+            <a:avLst/>
+          </a:prstGeom>
+          <a:solidFill>
+            <a:schemeClr val="bg1"/>
+          </a:solidFill>
+          <a:ln w="76200">
+            <a:solidFill>
+              <a:schemeClr val="tx1"/>
+            </a:solidFill>
+          </a:ln>
+        </p:spPr>
+        <p:style>
+          <a:lnRef idx="2">
+            <a:schemeClr val="accent1">
+              <a:shade val="15000"/>
+            </a:schemeClr>
+          </a:lnRef>
+          <a:fillRef idx="1">
+            <a:schemeClr val="accent1"/>
+          </a:fillRef>
+          <a:effectRef idx="0">
+            <a:schemeClr val="accent1"/>
+          </a:effectRef>
+          <a:fontRef idx="minor">
+            <a:schemeClr val="lt1"/>
+          </a:fontRef>
+        </p:style>
+        <p:txBody>
+          <a:bodyPr rtlCol="0" anchor="ctr"/>
+          <a:lstStyle/>
+          <a:p>
+            <a:pPr algn="ctr"/>
+            <a:endParaRPr lang="en-GB"/>
+          </a:p>
+        </p:txBody>
+      </p:sp>
       <p:pic>
         <p:nvPicPr>
-          <p:cNvPr id="1033" name="Picture 2" descr="Example of SMILES representation and one-hot vectors for benzene. For... |  Download Scientific Diagram">
-            <a:extLst>
-              <a:ext uri="{FF2B5EF4-FFF2-40B4-BE49-F238E27FC236}">
-                <a16:creationId xmlns:a16="http://schemas.microsoft.com/office/drawing/2014/main" id="{DD5C1A04-8290-014D-6D33-3E671993A6AA}"/>
+          <p:cNvPr id="4" name="Picture 2" descr="Example of SMILES representation and one-hot vectors for benzene. For... |  Download Scientific Diagram">
+            <a:extLst>
+              <a:ext uri="{FF2B5EF4-FFF2-40B4-BE49-F238E27FC236}">
+                <a16:creationId xmlns:a16="http://schemas.microsoft.com/office/drawing/2014/main" id="{35623D7A-2FEE-9ED4-1D1D-6BE8D6226912}"/>
               </a:ext>
             </a:extLst>
           </p:cNvPr>
@@ -6360,8 +6556,8 @@
         </p:blipFill>
         <p:spPr bwMode="auto">
           <a:xfrm>
-            <a:off x="897482" y="4662359"/>
-            <a:ext cx="581381" cy="563780"/>
+            <a:off x="635293" y="2515931"/>
+            <a:ext cx="484351" cy="469688"/>
           </a:xfrm>
           <a:prstGeom prst="rect">
             <a:avLst/>
@@ -6380,10 +6576,10 @@
       </p:pic>
       <p:sp>
         <p:nvSpPr>
-          <p:cNvPr id="1034" name="Cross 1033">
-            <a:extLst>
-              <a:ext uri="{FF2B5EF4-FFF2-40B4-BE49-F238E27FC236}">
-                <a16:creationId xmlns:a16="http://schemas.microsoft.com/office/drawing/2014/main" id="{3EFA2606-16C7-231A-0C3F-AD8F494C3966}"/>
+          <p:cNvPr id="5" name="Trapezoid 4">
+            <a:extLst>
+              <a:ext uri="{FF2B5EF4-FFF2-40B4-BE49-F238E27FC236}">
+                <a16:creationId xmlns:a16="http://schemas.microsoft.com/office/drawing/2014/main" id="{2D860B5D-241B-D29C-30C8-5C6AD09F9909}"/>
               </a:ext>
             </a:extLst>
           </p:cNvPr>
@@ -6391,22 +6587,20 @@
           <p:nvPr/>
         </p:nvSpPr>
         <p:spPr>
-          <a:xfrm>
-            <a:off x="1070042" y="5226139"/>
-            <a:ext cx="217089" cy="210517"/>
-          </a:xfrm>
-          <a:prstGeom prst="plus">
+          <a:xfrm rot="5400000">
+            <a:off x="5568675" y="2320318"/>
+            <a:ext cx="1443068" cy="774297"/>
+          </a:xfrm>
+          <a:prstGeom prst="trapezoid">
             <a:avLst>
-              <a:gd name="adj" fmla="val 43182"/>
+              <a:gd name="adj" fmla="val 39905"/>
             </a:avLst>
           </a:prstGeom>
           <a:solidFill>
             <a:schemeClr val="tx1"/>
           </a:solidFill>
           <a:ln>
-            <a:solidFill>
-              <a:schemeClr val="tx1"/>
-            </a:solidFill>
+            <a:noFill/>
           </a:ln>
         </p:spPr>
         <p:style>
@@ -6430,16 +6624,24 @@
           <a:lstStyle/>
           <a:p>
             <a:pPr algn="ctr"/>
-            <a:endParaRPr lang="en-GB"/>
-          </a:p>
-        </p:txBody>
-      </p:sp>
-      <p:sp>
-        <p:nvSpPr>
-          <p:cNvPr id="1035" name="Trapezoid 1034">
-            <a:extLst>
-              <a:ext uri="{FF2B5EF4-FFF2-40B4-BE49-F238E27FC236}">
-                <a16:creationId xmlns:a16="http://schemas.microsoft.com/office/drawing/2014/main" id="{6C2D7DB2-7491-70AF-4EB8-EDC4B8C2B718}"/>
+            <a:r>
+              <a:rPr lang="en-US" sz="1400" dirty="0">
+                <a:latin typeface="Palatino Linotype" panose="02040502050505030304" pitchFamily="18" charset="0"/>
+              </a:rPr>
+              <a:t>Encoder</a:t>
+            </a:r>
+            <a:endParaRPr lang="en-GB" sz="1400" dirty="0">
+              <a:latin typeface="Palatino Linotype" panose="02040502050505030304" pitchFamily="18" charset="0"/>
+            </a:endParaRPr>
+          </a:p>
+        </p:txBody>
+      </p:sp>
+      <p:sp>
+        <p:nvSpPr>
+          <p:cNvPr id="6" name="Trapezoid 5">
+            <a:extLst>
+              <a:ext uri="{FF2B5EF4-FFF2-40B4-BE49-F238E27FC236}">
+                <a16:creationId xmlns:a16="http://schemas.microsoft.com/office/drawing/2014/main" id="{D82216D8-3FEC-74F5-6879-77EE3D651BE3}"/>
               </a:ext>
             </a:extLst>
           </p:cNvPr>
@@ -6447,8 +6649,8 @@
           <p:nvPr/>
         </p:nvSpPr>
         <p:spPr>
-          <a:xfrm rot="5400000">
-            <a:off x="2876997" y="4630247"/>
+          <a:xfrm rot="16200000">
+            <a:off x="8502096" y="2270786"/>
             <a:ext cx="1443068" cy="774297"/>
           </a:xfrm>
           <a:prstGeom prst="trapezoid">
@@ -6488,7 +6690,7 @@
               <a:rPr lang="en-US" sz="1400" dirty="0">
                 <a:latin typeface="Palatino Linotype" panose="02040502050505030304" pitchFamily="18" charset="0"/>
               </a:rPr>
-              <a:t>Encoder</a:t>
+              <a:t>Decoder</a:t>
             </a:r>
             <a:endParaRPr lang="en-GB" sz="1400" dirty="0">
               <a:latin typeface="Palatino Linotype" panose="02040502050505030304" pitchFamily="18" charset="0"/>
@@ -6496,12 +6698,84 @@
           </a:p>
         </p:txBody>
       </p:sp>
-      <p:sp>
-        <p:nvSpPr>
-          <p:cNvPr id="1036" name="Trapezoid 1035">
-            <a:extLst>
-              <a:ext uri="{FF2B5EF4-FFF2-40B4-BE49-F238E27FC236}">
-                <a16:creationId xmlns:a16="http://schemas.microsoft.com/office/drawing/2014/main" id="{59C7B788-DD72-2078-7642-E55CAF4F2A9D}"/>
+      <p:pic>
+        <p:nvPicPr>
+          <p:cNvPr id="7" name="Picture 6">
+            <a:extLst>
+              <a:ext uri="{FF2B5EF4-FFF2-40B4-BE49-F238E27FC236}">
+                <a16:creationId xmlns:a16="http://schemas.microsoft.com/office/drawing/2014/main" id="{DB891F64-41D0-111A-5962-D5E4C2C160C5}"/>
+              </a:ext>
+            </a:extLst>
+          </p:cNvPr>
+          <p:cNvPicPr>
+            <a:picLocks noChangeAspect="1"/>
+          </p:cNvPicPr>
+          <p:nvPr/>
+        </p:nvPicPr>
+        <p:blipFill>
+          <a:blip r:embed="rId3">
+            <a:extLst>
+              <a:ext uri="{28A0092B-C50C-407E-A947-70E740481C1C}">
+                <a14:useLocalDpi xmlns:a14="http://schemas.microsoft.com/office/drawing/2010/main" val="0"/>
+              </a:ext>
+            </a:extLst>
+          </a:blip>
+          <a:stretch>
+            <a:fillRect/>
+          </a:stretch>
+        </p:blipFill>
+        <p:spPr>
+          <a:xfrm>
+            <a:off x="3014965" y="2379109"/>
+            <a:ext cx="1285714" cy="656712"/>
+          </a:xfrm>
+          <a:prstGeom prst="rect">
+            <a:avLst/>
+          </a:prstGeom>
+        </p:spPr>
+      </p:pic>
+      <p:pic>
+        <p:nvPicPr>
+          <p:cNvPr id="8" name="Picture 7" descr="A screenshot of a cell phone&#10;&#10;Description automatically generated">
+            <a:extLst>
+              <a:ext uri="{FF2B5EF4-FFF2-40B4-BE49-F238E27FC236}">
+                <a16:creationId xmlns:a16="http://schemas.microsoft.com/office/drawing/2014/main" id="{FB2C18AC-2A75-A136-06AF-CE17F522D760}"/>
+              </a:ext>
+            </a:extLst>
+          </p:cNvPr>
+          <p:cNvPicPr>
+            <a:picLocks noChangeAspect="1"/>
+          </p:cNvPicPr>
+          <p:nvPr/>
+        </p:nvPicPr>
+        <p:blipFill>
+          <a:blip r:embed="rId4">
+            <a:extLst>
+              <a:ext uri="{28A0092B-C50C-407E-A947-70E740481C1C}">
+                <a14:useLocalDpi xmlns:a14="http://schemas.microsoft.com/office/drawing/2010/main" val="0"/>
+              </a:ext>
+            </a:extLst>
+          </a:blip>
+          <a:stretch>
+            <a:fillRect/>
+          </a:stretch>
+        </p:blipFill>
+        <p:spPr>
+          <a:xfrm>
+            <a:off x="4857485" y="2336114"/>
+            <a:ext cx="428711" cy="776020"/>
+          </a:xfrm>
+          <a:prstGeom prst="rect">
+            <a:avLst/>
+          </a:prstGeom>
+        </p:spPr>
+      </p:pic>
+      <p:sp>
+        <p:nvSpPr>
+          <p:cNvPr id="9" name="Arrow: Right 8">
+            <a:extLst>
+              <a:ext uri="{FF2B5EF4-FFF2-40B4-BE49-F238E27FC236}">
+                <a16:creationId xmlns:a16="http://schemas.microsoft.com/office/drawing/2014/main" id="{87FFE0A7-AC2D-B20D-10B6-B6079998E8D8}"/>
               </a:ext>
             </a:extLst>
           </p:cNvPr>
@@ -6509,13 +6783,14 @@
           <p:nvPr/>
         </p:nvSpPr>
         <p:spPr>
-          <a:xfrm rot="16200000">
-            <a:off x="5713599" y="4662359"/>
-            <a:ext cx="1443068" cy="774297"/>
-          </a:xfrm>
-          <a:prstGeom prst="trapezoid">
+          <a:xfrm>
+            <a:off x="1178999" y="2562976"/>
+            <a:ext cx="507992" cy="375599"/>
+          </a:xfrm>
+          <a:prstGeom prst="rightArrow">
             <a:avLst>
-              <a:gd name="adj" fmla="val 39905"/>
+              <a:gd name="adj1" fmla="val 12988"/>
+              <a:gd name="adj2" fmla="val 56168"/>
             </a:avLst>
           </a:prstGeom>
           <a:solidFill>
@@ -6546,11 +6821,880 @@
           <a:lstStyle/>
           <a:p>
             <a:pPr algn="ctr"/>
-            <a:r>
-              <a:rPr lang="en-US" sz="1400" dirty="0">
+            <a:endParaRPr lang="en-GB"/>
+          </a:p>
+        </p:txBody>
+      </p:sp>
+      <p:sp>
+        <p:nvSpPr>
+          <p:cNvPr id="10" name="Arrow: Right 9">
+            <a:extLst>
+              <a:ext uri="{FF2B5EF4-FFF2-40B4-BE49-F238E27FC236}">
+                <a16:creationId xmlns:a16="http://schemas.microsoft.com/office/drawing/2014/main" id="{E540F5DB-5A0D-AD5C-0D74-8E72B12FF60D}"/>
+              </a:ext>
+            </a:extLst>
+          </p:cNvPr>
+          <p:cNvSpPr/>
+          <p:nvPr/>
+        </p:nvSpPr>
+        <p:spPr>
+          <a:xfrm>
+            <a:off x="4335188" y="2481969"/>
+            <a:ext cx="507992" cy="375599"/>
+          </a:xfrm>
+          <a:prstGeom prst="rightArrow">
+            <a:avLst>
+              <a:gd name="adj1" fmla="val 12988"/>
+              <a:gd name="adj2" fmla="val 56168"/>
+            </a:avLst>
+          </a:prstGeom>
+          <a:solidFill>
+            <a:schemeClr val="tx1"/>
+          </a:solidFill>
+          <a:ln>
+            <a:noFill/>
+          </a:ln>
+        </p:spPr>
+        <p:style>
+          <a:lnRef idx="2">
+            <a:schemeClr val="accent1">
+              <a:shade val="15000"/>
+            </a:schemeClr>
+          </a:lnRef>
+          <a:fillRef idx="1">
+            <a:schemeClr val="accent1"/>
+          </a:fillRef>
+          <a:effectRef idx="0">
+            <a:schemeClr val="accent1"/>
+          </a:effectRef>
+          <a:fontRef idx="minor">
+            <a:schemeClr val="lt1"/>
+          </a:fontRef>
+        </p:style>
+        <p:txBody>
+          <a:bodyPr rtlCol="0" anchor="ctr"/>
+          <a:lstStyle/>
+          <a:p>
+            <a:pPr algn="ctr"/>
+            <a:endParaRPr lang="en-GB"/>
+          </a:p>
+        </p:txBody>
+      </p:sp>
+      <p:sp>
+        <p:nvSpPr>
+          <p:cNvPr id="11" name="Arrow: Right 10">
+            <a:extLst>
+              <a:ext uri="{FF2B5EF4-FFF2-40B4-BE49-F238E27FC236}">
+                <a16:creationId xmlns:a16="http://schemas.microsoft.com/office/drawing/2014/main" id="{E1BA7309-B969-E59F-9E5A-0D27511A1D7D}"/>
+              </a:ext>
+            </a:extLst>
+          </p:cNvPr>
+          <p:cNvSpPr/>
+          <p:nvPr/>
+        </p:nvSpPr>
+        <p:spPr>
+          <a:xfrm>
+            <a:off x="5320706" y="2494488"/>
+            <a:ext cx="507992" cy="375599"/>
+          </a:xfrm>
+          <a:prstGeom prst="rightArrow">
+            <a:avLst>
+              <a:gd name="adj1" fmla="val 12988"/>
+              <a:gd name="adj2" fmla="val 56168"/>
+            </a:avLst>
+          </a:prstGeom>
+          <a:solidFill>
+            <a:schemeClr val="tx1"/>
+          </a:solidFill>
+          <a:ln>
+            <a:noFill/>
+          </a:ln>
+        </p:spPr>
+        <p:style>
+          <a:lnRef idx="2">
+            <a:schemeClr val="accent1">
+              <a:shade val="15000"/>
+            </a:schemeClr>
+          </a:lnRef>
+          <a:fillRef idx="1">
+            <a:schemeClr val="accent1"/>
+          </a:fillRef>
+          <a:effectRef idx="0">
+            <a:schemeClr val="accent1"/>
+          </a:effectRef>
+          <a:fontRef idx="minor">
+            <a:schemeClr val="lt1"/>
+          </a:fontRef>
+        </p:style>
+        <p:txBody>
+          <a:bodyPr rtlCol="0" anchor="ctr"/>
+          <a:lstStyle/>
+          <a:p>
+            <a:pPr algn="ctr"/>
+            <a:endParaRPr lang="en-GB"/>
+          </a:p>
+        </p:txBody>
+      </p:sp>
+      <p:sp>
+        <p:nvSpPr>
+          <p:cNvPr id="12" name="Rectangle 11">
+            <a:extLst>
+              <a:ext uri="{FF2B5EF4-FFF2-40B4-BE49-F238E27FC236}">
+                <a16:creationId xmlns:a16="http://schemas.microsoft.com/office/drawing/2014/main" id="{7D26DF70-A0F7-CD36-42AE-EAEA69195BF5}"/>
+              </a:ext>
+            </a:extLst>
+          </p:cNvPr>
+          <p:cNvSpPr/>
+          <p:nvPr/>
+        </p:nvSpPr>
+        <p:spPr>
+          <a:xfrm>
+            <a:off x="6760124" y="2355027"/>
+            <a:ext cx="660506" cy="704877"/>
+          </a:xfrm>
+          <a:prstGeom prst="rect">
+            <a:avLst/>
+          </a:prstGeom>
+          <a:solidFill>
+            <a:schemeClr val="tx1"/>
+          </a:solidFill>
+          <a:ln>
+            <a:noFill/>
+          </a:ln>
+        </p:spPr>
+        <p:style>
+          <a:lnRef idx="2">
+            <a:schemeClr val="accent1">
+              <a:shade val="15000"/>
+            </a:schemeClr>
+          </a:lnRef>
+          <a:fillRef idx="1">
+            <a:schemeClr val="accent1"/>
+          </a:fillRef>
+          <a:effectRef idx="0">
+            <a:schemeClr val="accent1"/>
+          </a:effectRef>
+          <a:fontRef idx="minor">
+            <a:schemeClr val="lt1"/>
+          </a:fontRef>
+        </p:style>
+        <p:txBody>
+          <a:bodyPr rtlCol="0" anchor="ctr"/>
+          <a:lstStyle/>
+          <a:p>
+            <a:pPr algn="ctr"/>
+            <a:r>
+              <a:rPr lang="en-US" sz="1050" dirty="0">
                 <a:latin typeface="Palatino Linotype" panose="02040502050505030304" pitchFamily="18" charset="0"/>
               </a:rPr>
-              <a:t>Decoder</a:t>
+              <a:t>Latent Space</a:t>
+            </a:r>
+            <a:endParaRPr lang="en-GB" sz="1050" dirty="0">
+              <a:latin typeface="Palatino Linotype" panose="02040502050505030304" pitchFamily="18" charset="0"/>
+            </a:endParaRPr>
+          </a:p>
+        </p:txBody>
+      </p:sp>
+      <p:sp>
+        <p:nvSpPr>
+          <p:cNvPr id="13" name="Rectangle 12">
+            <a:extLst>
+              <a:ext uri="{FF2B5EF4-FFF2-40B4-BE49-F238E27FC236}">
+                <a16:creationId xmlns:a16="http://schemas.microsoft.com/office/drawing/2014/main" id="{1B7ADCD3-B2A6-D9BA-F119-EEF42DF5D12D}"/>
+              </a:ext>
+            </a:extLst>
+          </p:cNvPr>
+          <p:cNvSpPr/>
+          <p:nvPr/>
+        </p:nvSpPr>
+        <p:spPr>
+          <a:xfrm>
+            <a:off x="8093209" y="1978912"/>
+            <a:ext cx="660506" cy="704877"/>
+          </a:xfrm>
+          <a:prstGeom prst="rect">
+            <a:avLst/>
+          </a:prstGeom>
+          <a:solidFill>
+            <a:schemeClr val="tx1"/>
+          </a:solidFill>
+          <a:ln>
+            <a:noFill/>
+          </a:ln>
+        </p:spPr>
+        <p:style>
+          <a:lnRef idx="2">
+            <a:schemeClr val="accent1">
+              <a:shade val="15000"/>
+            </a:schemeClr>
+          </a:lnRef>
+          <a:fillRef idx="1">
+            <a:schemeClr val="accent1"/>
+          </a:fillRef>
+          <a:effectRef idx="0">
+            <a:schemeClr val="accent1"/>
+          </a:effectRef>
+          <a:fontRef idx="minor">
+            <a:schemeClr val="lt1"/>
+          </a:fontRef>
+        </p:style>
+        <p:txBody>
+          <a:bodyPr rtlCol="0" anchor="ctr"/>
+          <a:lstStyle/>
+          <a:p>
+            <a:pPr algn="ctr"/>
+            <a:r>
+              <a:rPr lang="en-US" sz="1050" dirty="0">
+                <a:latin typeface="Palatino Linotype" panose="02040502050505030304" pitchFamily="18" charset="0"/>
+              </a:rPr>
+              <a:t>Latent Space</a:t>
+            </a:r>
+            <a:endParaRPr lang="en-GB" sz="1050" dirty="0">
+              <a:latin typeface="Palatino Linotype" panose="02040502050505030304" pitchFamily="18" charset="0"/>
+            </a:endParaRPr>
+          </a:p>
+        </p:txBody>
+      </p:sp>
+      <p:sp>
+        <p:nvSpPr>
+          <p:cNvPr id="14" name="Arrow: Right 13">
+            <a:extLst>
+              <a:ext uri="{FF2B5EF4-FFF2-40B4-BE49-F238E27FC236}">
+                <a16:creationId xmlns:a16="http://schemas.microsoft.com/office/drawing/2014/main" id="{AA4AFE2A-1EB6-E842-7127-18B357CEB1B2}"/>
+              </a:ext>
+            </a:extLst>
+          </p:cNvPr>
+          <p:cNvSpPr/>
+          <p:nvPr/>
+        </p:nvSpPr>
+        <p:spPr>
+          <a:xfrm>
+            <a:off x="7489649" y="2494488"/>
+            <a:ext cx="507992" cy="375599"/>
+          </a:xfrm>
+          <a:prstGeom prst="rightArrow">
+            <a:avLst>
+              <a:gd name="adj1" fmla="val 12988"/>
+              <a:gd name="adj2" fmla="val 56168"/>
+            </a:avLst>
+          </a:prstGeom>
+          <a:solidFill>
+            <a:schemeClr val="tx1"/>
+          </a:solidFill>
+          <a:ln>
+            <a:noFill/>
+          </a:ln>
+        </p:spPr>
+        <p:style>
+          <a:lnRef idx="2">
+            <a:schemeClr val="accent1">
+              <a:shade val="15000"/>
+            </a:schemeClr>
+          </a:lnRef>
+          <a:fillRef idx="1">
+            <a:schemeClr val="accent1"/>
+          </a:fillRef>
+          <a:effectRef idx="0">
+            <a:schemeClr val="accent1"/>
+          </a:effectRef>
+          <a:fontRef idx="minor">
+            <a:schemeClr val="lt1"/>
+          </a:fontRef>
+        </p:style>
+        <p:txBody>
+          <a:bodyPr rtlCol="0" anchor="ctr"/>
+          <a:lstStyle/>
+          <a:p>
+            <a:pPr algn="ctr"/>
+            <a:endParaRPr lang="en-GB"/>
+          </a:p>
+        </p:txBody>
+      </p:sp>
+      <p:sp>
+        <p:nvSpPr>
+          <p:cNvPr id="15" name="Rectangle 14">
+            <a:extLst>
+              <a:ext uri="{FF2B5EF4-FFF2-40B4-BE49-F238E27FC236}">
+                <a16:creationId xmlns:a16="http://schemas.microsoft.com/office/drawing/2014/main" id="{F5D8A65B-1670-3BC0-0144-4B80193B2E8D}"/>
+              </a:ext>
+            </a:extLst>
+          </p:cNvPr>
+          <p:cNvSpPr/>
+          <p:nvPr/>
+        </p:nvSpPr>
+        <p:spPr>
+          <a:xfrm>
+            <a:off x="8093209" y="2724124"/>
+            <a:ext cx="660506" cy="704877"/>
+          </a:xfrm>
+          <a:prstGeom prst="rect">
+            <a:avLst/>
+          </a:prstGeom>
+          <a:solidFill>
+            <a:schemeClr val="tx1"/>
+          </a:solidFill>
+          <a:ln>
+            <a:noFill/>
+          </a:ln>
+        </p:spPr>
+        <p:style>
+          <a:lnRef idx="2">
+            <a:schemeClr val="accent1">
+              <a:shade val="15000"/>
+            </a:schemeClr>
+          </a:lnRef>
+          <a:fillRef idx="1">
+            <a:schemeClr val="accent1"/>
+          </a:fillRef>
+          <a:effectRef idx="0">
+            <a:schemeClr val="accent1"/>
+          </a:effectRef>
+          <a:fontRef idx="minor">
+            <a:schemeClr val="lt1"/>
+          </a:fontRef>
+        </p:style>
+        <p:txBody>
+          <a:bodyPr rtlCol="0" anchor="ctr"/>
+          <a:lstStyle/>
+          <a:p>
+            <a:pPr algn="ctr"/>
+            <a:r>
+              <a:rPr lang="en-US" sz="800" dirty="0">
+                <a:latin typeface="Palatino Linotype" panose="02040502050505030304" pitchFamily="18" charset="0"/>
+              </a:rPr>
+              <a:t>Condition Vector</a:t>
+            </a:r>
+            <a:endParaRPr lang="en-GB" sz="800" dirty="0">
+              <a:latin typeface="Palatino Linotype" panose="02040502050505030304" pitchFamily="18" charset="0"/>
+            </a:endParaRPr>
+          </a:p>
+        </p:txBody>
+      </p:sp>
+      <p:sp>
+        <p:nvSpPr>
+          <p:cNvPr id="16" name="Right Brace 15">
+            <a:extLst>
+              <a:ext uri="{FF2B5EF4-FFF2-40B4-BE49-F238E27FC236}">
+                <a16:creationId xmlns:a16="http://schemas.microsoft.com/office/drawing/2014/main" id="{945583DA-A16F-BBF3-93B2-F780476E9058}"/>
+              </a:ext>
+            </a:extLst>
+          </p:cNvPr>
+          <p:cNvSpPr/>
+          <p:nvPr/>
+        </p:nvSpPr>
+        <p:spPr>
+          <a:xfrm rot="5400000">
+            <a:off x="7405790" y="1697703"/>
+            <a:ext cx="675710" cy="3894472"/>
+          </a:xfrm>
+          <a:prstGeom prst="rightBrace">
+            <a:avLst>
+              <a:gd name="adj1" fmla="val 8333"/>
+              <a:gd name="adj2" fmla="val 50000"/>
+            </a:avLst>
+          </a:prstGeom>
+          <a:ln w="57150">
+            <a:solidFill>
+              <a:schemeClr val="tx1"/>
+            </a:solidFill>
+          </a:ln>
+        </p:spPr>
+        <p:style>
+          <a:lnRef idx="1">
+            <a:schemeClr val="accent1"/>
+          </a:lnRef>
+          <a:fillRef idx="0">
+            <a:schemeClr val="accent1"/>
+          </a:fillRef>
+          <a:effectRef idx="0">
+            <a:schemeClr val="accent1"/>
+          </a:effectRef>
+          <a:fontRef idx="minor">
+            <a:schemeClr val="tx1"/>
+          </a:fontRef>
+        </p:style>
+        <p:txBody>
+          <a:bodyPr rtlCol="0" anchor="ctr"/>
+          <a:lstStyle/>
+          <a:p>
+            <a:pPr algn="ctr"/>
+            <a:endParaRPr lang="en-GB"/>
+          </a:p>
+        </p:txBody>
+      </p:sp>
+      <p:sp>
+        <p:nvSpPr>
+          <p:cNvPr id="17" name="Right Brace 16">
+            <a:extLst>
+              <a:ext uri="{FF2B5EF4-FFF2-40B4-BE49-F238E27FC236}">
+                <a16:creationId xmlns:a16="http://schemas.microsoft.com/office/drawing/2014/main" id="{E35CF67B-5AC9-200F-C418-B09D1803E6D5}"/>
+              </a:ext>
+            </a:extLst>
+          </p:cNvPr>
+          <p:cNvSpPr/>
+          <p:nvPr/>
+        </p:nvSpPr>
+        <p:spPr>
+          <a:xfrm rot="5400000">
+            <a:off x="2792782" y="1066064"/>
+            <a:ext cx="675710" cy="5157752"/>
+          </a:xfrm>
+          <a:prstGeom prst="rightBrace">
+            <a:avLst>
+              <a:gd name="adj1" fmla="val 8333"/>
+              <a:gd name="adj2" fmla="val 50000"/>
+            </a:avLst>
+          </a:prstGeom>
+          <a:ln w="57150">
+            <a:solidFill>
+              <a:schemeClr val="tx1"/>
+            </a:solidFill>
+          </a:ln>
+        </p:spPr>
+        <p:style>
+          <a:lnRef idx="1">
+            <a:schemeClr val="accent1"/>
+          </a:lnRef>
+          <a:fillRef idx="0">
+            <a:schemeClr val="accent1"/>
+          </a:fillRef>
+          <a:effectRef idx="0">
+            <a:schemeClr val="accent1"/>
+          </a:effectRef>
+          <a:fontRef idx="minor">
+            <a:schemeClr val="tx1"/>
+          </a:fontRef>
+        </p:style>
+        <p:txBody>
+          <a:bodyPr rtlCol="0" anchor="ctr"/>
+          <a:lstStyle/>
+          <a:p>
+            <a:pPr algn="ctr"/>
+            <a:endParaRPr lang="en-GB"/>
+          </a:p>
+        </p:txBody>
+      </p:sp>
+      <p:sp>
+        <p:nvSpPr>
+          <p:cNvPr id="18" name="TextBox 17">
+            <a:extLst>
+              <a:ext uri="{FF2B5EF4-FFF2-40B4-BE49-F238E27FC236}">
+                <a16:creationId xmlns:a16="http://schemas.microsoft.com/office/drawing/2014/main" id="{E2081DA8-FB7C-8FEA-316C-9820AA977289}"/>
+              </a:ext>
+            </a:extLst>
+          </p:cNvPr>
+          <p:cNvSpPr txBox="1"/>
+          <p:nvPr/>
+        </p:nvSpPr>
+        <p:spPr>
+          <a:xfrm>
+            <a:off x="2268993" y="3905289"/>
+            <a:ext cx="1723287" cy="338554"/>
+          </a:xfrm>
+          <a:prstGeom prst="rect">
+            <a:avLst/>
+          </a:prstGeom>
+          <a:noFill/>
+        </p:spPr>
+        <p:txBody>
+          <a:bodyPr wrap="square" rtlCol="0">
+            <a:spAutoFit/>
+          </a:bodyPr>
+          <a:lstStyle/>
+          <a:p>
+            <a:pPr algn="ctr"/>
+            <a:r>
+              <a:rPr lang="en-US" sz="1600" b="1" dirty="0">
+                <a:latin typeface="Palatino Linotype" panose="02040502050505030304" pitchFamily="18" charset="0"/>
+              </a:rPr>
+              <a:t>Preprocessing</a:t>
+            </a:r>
+            <a:endParaRPr lang="en-GB" sz="1600" b="1" dirty="0">
+              <a:latin typeface="Palatino Linotype" panose="02040502050505030304" pitchFamily="18" charset="0"/>
+            </a:endParaRPr>
+          </a:p>
+        </p:txBody>
+      </p:sp>
+      <p:sp>
+        <p:nvSpPr>
+          <p:cNvPr id="19" name="TextBox 18">
+            <a:extLst>
+              <a:ext uri="{FF2B5EF4-FFF2-40B4-BE49-F238E27FC236}">
+                <a16:creationId xmlns:a16="http://schemas.microsoft.com/office/drawing/2014/main" id="{48521F2B-1BCF-3373-59E8-6D02BA953FCA}"/>
+              </a:ext>
+            </a:extLst>
+          </p:cNvPr>
+          <p:cNvSpPr txBox="1"/>
+          <p:nvPr/>
+        </p:nvSpPr>
+        <p:spPr>
+          <a:xfrm>
+            <a:off x="6428480" y="3931192"/>
+            <a:ext cx="2862887" cy="338554"/>
+          </a:xfrm>
+          <a:prstGeom prst="rect">
+            <a:avLst/>
+          </a:prstGeom>
+          <a:noFill/>
+        </p:spPr>
+        <p:txBody>
+          <a:bodyPr wrap="square" rtlCol="0">
+            <a:spAutoFit/>
+          </a:bodyPr>
+          <a:lstStyle/>
+          <a:p>
+            <a:r>
+              <a:rPr lang="en-US" sz="1600" b="1" dirty="0">
+                <a:latin typeface="Palatino Linotype" panose="02040502050505030304" pitchFamily="18" charset="0"/>
+              </a:rPr>
+              <a:t>Variational Auto Encoder</a:t>
+            </a:r>
+            <a:endParaRPr lang="en-GB" sz="1600" b="1" dirty="0">
+              <a:latin typeface="Palatino Linotype" panose="02040502050505030304" pitchFamily="18" charset="0"/>
+            </a:endParaRPr>
+          </a:p>
+        </p:txBody>
+      </p:sp>
+      <p:sp>
+        <p:nvSpPr>
+          <p:cNvPr id="20" name="TextBox 19">
+            <a:extLst>
+              <a:ext uri="{FF2B5EF4-FFF2-40B4-BE49-F238E27FC236}">
+                <a16:creationId xmlns:a16="http://schemas.microsoft.com/office/drawing/2014/main" id="{E6A8AF5E-B463-5631-BBBA-174D25BAA337}"/>
+              </a:ext>
+            </a:extLst>
+          </p:cNvPr>
+          <p:cNvSpPr txBox="1"/>
+          <p:nvPr/>
+        </p:nvSpPr>
+        <p:spPr>
+          <a:xfrm>
+            <a:off x="434788" y="2075837"/>
+            <a:ext cx="951036" cy="307777"/>
+          </a:xfrm>
+          <a:prstGeom prst="rect">
+            <a:avLst/>
+          </a:prstGeom>
+          <a:noFill/>
+        </p:spPr>
+        <p:txBody>
+          <a:bodyPr wrap="square" rtlCol="0">
+            <a:spAutoFit/>
+          </a:bodyPr>
+          <a:lstStyle/>
+          <a:p>
+            <a:pPr algn="ctr"/>
+            <a:r>
+              <a:rPr lang="en-US" sz="1400" b="1" dirty="0">
+                <a:latin typeface="Palatino Linotype" panose="02040502050505030304" pitchFamily="18" charset="0"/>
+              </a:rPr>
+              <a:t>Molecule</a:t>
+            </a:r>
+            <a:endParaRPr lang="en-GB" sz="1400" b="1" dirty="0">
+              <a:latin typeface="Palatino Linotype" panose="02040502050505030304" pitchFamily="18" charset="0"/>
+            </a:endParaRPr>
+          </a:p>
+        </p:txBody>
+      </p:sp>
+      <p:sp>
+        <p:nvSpPr>
+          <p:cNvPr id="21" name="TextBox 20">
+            <a:extLst>
+              <a:ext uri="{FF2B5EF4-FFF2-40B4-BE49-F238E27FC236}">
+                <a16:creationId xmlns:a16="http://schemas.microsoft.com/office/drawing/2014/main" id="{26AA8017-96F4-2F89-0BC3-5B4665D157EA}"/>
+              </a:ext>
+            </a:extLst>
+          </p:cNvPr>
+          <p:cNvSpPr txBox="1"/>
+          <p:nvPr/>
+        </p:nvSpPr>
+        <p:spPr>
+          <a:xfrm>
+            <a:off x="4353217" y="1781580"/>
+            <a:ext cx="1198903" cy="523220"/>
+          </a:xfrm>
+          <a:prstGeom prst="rect">
+            <a:avLst/>
+          </a:prstGeom>
+          <a:noFill/>
+        </p:spPr>
+        <p:txBody>
+          <a:bodyPr wrap="square" rtlCol="0">
+            <a:spAutoFit/>
+          </a:bodyPr>
+          <a:lstStyle/>
+          <a:p>
+            <a:pPr algn="ctr"/>
+            <a:r>
+              <a:rPr lang="en-US" sz="1400" b="1" dirty="0">
+                <a:latin typeface="Palatino Linotype" panose="02040502050505030304" pitchFamily="18" charset="0"/>
+              </a:rPr>
+              <a:t>Vector Form of SMILES</a:t>
+            </a:r>
+            <a:endParaRPr lang="en-GB" sz="1400" b="1" dirty="0">
+              <a:latin typeface="Palatino Linotype" panose="02040502050505030304" pitchFamily="18" charset="0"/>
+            </a:endParaRPr>
+          </a:p>
+        </p:txBody>
+      </p:sp>
+      <p:sp>
+        <p:nvSpPr>
+          <p:cNvPr id="22" name="TextBox 21">
+            <a:extLst>
+              <a:ext uri="{FF2B5EF4-FFF2-40B4-BE49-F238E27FC236}">
+                <a16:creationId xmlns:a16="http://schemas.microsoft.com/office/drawing/2014/main" id="{517A711D-6FC5-E315-9181-C9BD9CFC2E7D}"/>
+              </a:ext>
+            </a:extLst>
+          </p:cNvPr>
+          <p:cNvSpPr txBox="1"/>
+          <p:nvPr/>
+        </p:nvSpPr>
+        <p:spPr>
+          <a:xfrm>
+            <a:off x="7424299" y="1630782"/>
+            <a:ext cx="1949512" cy="400110"/>
+          </a:xfrm>
+          <a:prstGeom prst="rect">
+            <a:avLst/>
+          </a:prstGeom>
+          <a:noFill/>
+        </p:spPr>
+        <p:txBody>
+          <a:bodyPr wrap="square" rtlCol="0">
+            <a:spAutoFit/>
+          </a:bodyPr>
+          <a:lstStyle/>
+          <a:p>
+            <a:pPr algn="ctr"/>
+            <a:r>
+              <a:rPr lang="en-US" sz="1000" b="1" dirty="0">
+                <a:latin typeface="Palatino Linotype" panose="02040502050505030304" pitchFamily="18" charset="0"/>
+              </a:rPr>
+              <a:t>Concatenate Latent Space with condition for decoder</a:t>
+            </a:r>
+            <a:endParaRPr lang="en-GB" sz="1000" b="1" dirty="0">
+              <a:latin typeface="Palatino Linotype" panose="02040502050505030304" pitchFamily="18" charset="0"/>
+            </a:endParaRPr>
+          </a:p>
+        </p:txBody>
+      </p:sp>
+      <p:pic>
+        <p:nvPicPr>
+          <p:cNvPr id="27" name="Picture 26">
+            <a:extLst>
+              <a:ext uri="{FF2B5EF4-FFF2-40B4-BE49-F238E27FC236}">
+                <a16:creationId xmlns:a16="http://schemas.microsoft.com/office/drawing/2014/main" id="{FB39DD78-43D4-EB40-88A1-96339950D00F}"/>
+              </a:ext>
+            </a:extLst>
+          </p:cNvPr>
+          <p:cNvPicPr>
+            <a:picLocks noChangeAspect="1"/>
+          </p:cNvPicPr>
+          <p:nvPr/>
+        </p:nvPicPr>
+        <p:blipFill rotWithShape="1">
+          <a:blip r:embed="rId5">
+            <a:extLst>
+              <a:ext uri="{28A0092B-C50C-407E-A947-70E740481C1C}">
+                <a14:useLocalDpi xmlns:a14="http://schemas.microsoft.com/office/drawing/2010/main" val="0"/>
+              </a:ext>
+            </a:extLst>
+          </a:blip>
+          <a:srcRect l="33380" t="41665" r="34499" b="42880"/>
+          <a:stretch/>
+        </p:blipFill>
+        <p:spPr>
+          <a:xfrm>
+            <a:off x="10258403" y="2363524"/>
+            <a:ext cx="1223793" cy="588819"/>
+          </a:xfrm>
+          <a:prstGeom prst="rect">
+            <a:avLst/>
+          </a:prstGeom>
+        </p:spPr>
+      </p:pic>
+      <p:sp>
+        <p:nvSpPr>
+          <p:cNvPr id="28" name="Arrow: Right 27">
+            <a:extLst>
+              <a:ext uri="{FF2B5EF4-FFF2-40B4-BE49-F238E27FC236}">
+                <a16:creationId xmlns:a16="http://schemas.microsoft.com/office/drawing/2014/main" id="{639CBEC2-7631-A2DF-DFC1-535AED105096}"/>
+              </a:ext>
+            </a:extLst>
+          </p:cNvPr>
+          <p:cNvSpPr/>
+          <p:nvPr/>
+        </p:nvSpPr>
+        <p:spPr>
+          <a:xfrm>
+            <a:off x="9691056" y="2487337"/>
+            <a:ext cx="507992" cy="375599"/>
+          </a:xfrm>
+          <a:prstGeom prst="rightArrow">
+            <a:avLst>
+              <a:gd name="adj1" fmla="val 12988"/>
+              <a:gd name="adj2" fmla="val 56168"/>
+            </a:avLst>
+          </a:prstGeom>
+          <a:solidFill>
+            <a:schemeClr val="tx1"/>
+          </a:solidFill>
+          <a:ln>
+            <a:noFill/>
+          </a:ln>
+        </p:spPr>
+        <p:style>
+          <a:lnRef idx="2">
+            <a:schemeClr val="accent1">
+              <a:shade val="15000"/>
+            </a:schemeClr>
+          </a:lnRef>
+          <a:fillRef idx="1">
+            <a:schemeClr val="accent1"/>
+          </a:fillRef>
+          <a:effectRef idx="0">
+            <a:schemeClr val="accent1"/>
+          </a:effectRef>
+          <a:fontRef idx="minor">
+            <a:schemeClr val="lt1"/>
+          </a:fontRef>
+        </p:style>
+        <p:txBody>
+          <a:bodyPr rtlCol="0" anchor="ctr"/>
+          <a:lstStyle/>
+          <a:p>
+            <a:pPr algn="ctr"/>
+            <a:endParaRPr lang="en-GB"/>
+          </a:p>
+        </p:txBody>
+      </p:sp>
+      <p:sp>
+        <p:nvSpPr>
+          <p:cNvPr id="29" name="Right Brace 28">
+            <a:extLst>
+              <a:ext uri="{FF2B5EF4-FFF2-40B4-BE49-F238E27FC236}">
+                <a16:creationId xmlns:a16="http://schemas.microsoft.com/office/drawing/2014/main" id="{398EA38C-1049-E0B0-D546-9AA29256E142}"/>
+              </a:ext>
+            </a:extLst>
+          </p:cNvPr>
+          <p:cNvSpPr/>
+          <p:nvPr/>
+        </p:nvSpPr>
+        <p:spPr>
+          <a:xfrm rot="5400000">
+            <a:off x="10379851" y="2729771"/>
+            <a:ext cx="675710" cy="1806327"/>
+          </a:xfrm>
+          <a:prstGeom prst="rightBrace">
+            <a:avLst>
+              <a:gd name="adj1" fmla="val 8333"/>
+              <a:gd name="adj2" fmla="val 50000"/>
+            </a:avLst>
+          </a:prstGeom>
+          <a:ln w="57150">
+            <a:solidFill>
+              <a:schemeClr val="tx1"/>
+            </a:solidFill>
+          </a:ln>
+        </p:spPr>
+        <p:style>
+          <a:lnRef idx="1">
+            <a:schemeClr val="accent1"/>
+          </a:lnRef>
+          <a:fillRef idx="0">
+            <a:schemeClr val="accent1"/>
+          </a:fillRef>
+          <a:effectRef idx="0">
+            <a:schemeClr val="accent1"/>
+          </a:effectRef>
+          <a:fontRef idx="minor">
+            <a:schemeClr val="tx1"/>
+          </a:fontRef>
+        </p:style>
+        <p:txBody>
+          <a:bodyPr rtlCol="0" anchor="ctr"/>
+          <a:lstStyle/>
+          <a:p>
+            <a:pPr algn="ctr"/>
+            <a:endParaRPr lang="en-GB"/>
+          </a:p>
+        </p:txBody>
+      </p:sp>
+      <p:sp>
+        <p:nvSpPr>
+          <p:cNvPr id="30" name="TextBox 29">
+            <a:extLst>
+              <a:ext uri="{FF2B5EF4-FFF2-40B4-BE49-F238E27FC236}">
+                <a16:creationId xmlns:a16="http://schemas.microsoft.com/office/drawing/2014/main" id="{FA66DCFD-3AE6-5AC5-FB80-82813E6DFFE8}"/>
+              </a:ext>
+            </a:extLst>
+          </p:cNvPr>
+          <p:cNvSpPr txBox="1"/>
+          <p:nvPr/>
+        </p:nvSpPr>
+        <p:spPr>
+          <a:xfrm>
+            <a:off x="9833910" y="3906134"/>
+            <a:ext cx="1806329" cy="338554"/>
+          </a:xfrm>
+          <a:prstGeom prst="rect">
+            <a:avLst/>
+          </a:prstGeom>
+          <a:noFill/>
+        </p:spPr>
+        <p:txBody>
+          <a:bodyPr wrap="square" rtlCol="0">
+            <a:spAutoFit/>
+          </a:bodyPr>
+          <a:lstStyle/>
+          <a:p>
+            <a:pPr algn="ctr"/>
+            <a:r>
+              <a:rPr lang="en-US" sz="1600" b="1" dirty="0">
+                <a:latin typeface="Palatino Linotype" panose="02040502050505030304" pitchFamily="18" charset="0"/>
+              </a:rPr>
+              <a:t>Post Processing</a:t>
+            </a:r>
+            <a:endParaRPr lang="en-GB" sz="1600" b="1" dirty="0">
+              <a:latin typeface="Palatino Linotype" panose="02040502050505030304" pitchFamily="18" charset="0"/>
+            </a:endParaRPr>
+          </a:p>
+        </p:txBody>
+      </p:sp>
+      <p:sp>
+        <p:nvSpPr>
+          <p:cNvPr id="31" name="TextBox 30">
+            <a:extLst>
+              <a:ext uri="{FF2B5EF4-FFF2-40B4-BE49-F238E27FC236}">
+                <a16:creationId xmlns:a16="http://schemas.microsoft.com/office/drawing/2014/main" id="{ED2C04F8-87FD-E5D7-2C56-291DE2DBC06B}"/>
+              </a:ext>
+            </a:extLst>
+          </p:cNvPr>
+          <p:cNvSpPr txBox="1"/>
+          <p:nvPr/>
+        </p:nvSpPr>
+        <p:spPr>
+          <a:xfrm>
+            <a:off x="1636758" y="2562310"/>
+            <a:ext cx="884454" cy="307777"/>
+          </a:xfrm>
+          <a:prstGeom prst="rect">
+            <a:avLst/>
+          </a:prstGeom>
+          <a:noFill/>
+        </p:spPr>
+        <p:txBody>
+          <a:bodyPr wrap="square">
+            <a:spAutoFit/>
+          </a:bodyPr>
+          <a:lstStyle/>
+          <a:p>
+            <a:r>
+              <a:rPr lang="en-GB" sz="1400" b="0" i="0" dirty="0">
+                <a:effectLst/>
+                <a:latin typeface="Palatino Linotype" panose="02040502050505030304" pitchFamily="18" charset="0"/>
+              </a:rPr>
+              <a:t>c1ccccc1</a:t>
             </a:r>
             <a:endParaRPr lang="en-GB" sz="1400" dirty="0">
               <a:latin typeface="Palatino Linotype" panose="02040502050505030304" pitchFamily="18" charset="0"/>
@@ -6558,10 +7702,106 @@
           </a:p>
         </p:txBody>
       </p:sp>
+      <p:sp>
+        <p:nvSpPr>
+          <p:cNvPr id="32" name="Arrow: Right 31">
+            <a:extLst>
+              <a:ext uri="{FF2B5EF4-FFF2-40B4-BE49-F238E27FC236}">
+                <a16:creationId xmlns:a16="http://schemas.microsoft.com/office/drawing/2014/main" id="{C27DA2B9-8B15-1D09-A5AF-15036CAB0867}"/>
+              </a:ext>
+            </a:extLst>
+          </p:cNvPr>
+          <p:cNvSpPr/>
+          <p:nvPr/>
+        </p:nvSpPr>
+        <p:spPr>
+          <a:xfrm>
+            <a:off x="2440275" y="2536323"/>
+            <a:ext cx="507992" cy="375599"/>
+          </a:xfrm>
+          <a:prstGeom prst="rightArrow">
+            <a:avLst>
+              <a:gd name="adj1" fmla="val 12988"/>
+              <a:gd name="adj2" fmla="val 56168"/>
+            </a:avLst>
+          </a:prstGeom>
+          <a:solidFill>
+            <a:schemeClr val="tx1"/>
+          </a:solidFill>
+          <a:ln>
+            <a:noFill/>
+          </a:ln>
+        </p:spPr>
+        <p:style>
+          <a:lnRef idx="2">
+            <a:schemeClr val="accent1">
+              <a:shade val="15000"/>
+            </a:schemeClr>
+          </a:lnRef>
+          <a:fillRef idx="1">
+            <a:schemeClr val="accent1"/>
+          </a:fillRef>
+          <a:effectRef idx="0">
+            <a:schemeClr val="accent1"/>
+          </a:effectRef>
+          <a:fontRef idx="minor">
+            <a:schemeClr val="lt1"/>
+          </a:fontRef>
+        </p:style>
+        <p:txBody>
+          <a:bodyPr rtlCol="0" anchor="ctr"/>
+          <a:lstStyle/>
+          <a:p>
+            <a:pPr algn="ctr"/>
+            <a:endParaRPr lang="en-GB"/>
+          </a:p>
+        </p:txBody>
+      </p:sp>
+      <p:sp>
+        <p:nvSpPr>
+          <p:cNvPr id="34" name="TextBox 33">
+            <a:extLst>
+              <a:ext uri="{FF2B5EF4-FFF2-40B4-BE49-F238E27FC236}">
+                <a16:creationId xmlns:a16="http://schemas.microsoft.com/office/drawing/2014/main" id="{99FE391C-7B89-3FDD-5053-AEB94BE4C31A}"/>
+              </a:ext>
+            </a:extLst>
+          </p:cNvPr>
+          <p:cNvSpPr txBox="1"/>
+          <p:nvPr/>
+        </p:nvSpPr>
+        <p:spPr>
+          <a:xfrm>
+            <a:off x="1392976" y="1985932"/>
+            <a:ext cx="1442220" cy="523220"/>
+          </a:xfrm>
+          <a:prstGeom prst="rect">
+            <a:avLst/>
+          </a:prstGeom>
+          <a:noFill/>
+        </p:spPr>
+        <p:txBody>
+          <a:bodyPr wrap="square" rtlCol="0">
+            <a:spAutoFit/>
+          </a:bodyPr>
+          <a:lstStyle/>
+          <a:p>
+            <a:pPr algn="ctr"/>
+            <a:r>
+              <a:rPr lang="en-US" sz="1400" b="1" dirty="0">
+                <a:latin typeface="Palatino Linotype" panose="02040502050505030304" pitchFamily="18" charset="0"/>
+              </a:rPr>
+              <a:t>SMILES Representation</a:t>
+            </a:r>
+            <a:endParaRPr lang="en-GB" sz="1400" b="1" dirty="0">
+              <a:latin typeface="Palatino Linotype" panose="02040502050505030304" pitchFamily="18" charset="0"/>
+            </a:endParaRPr>
+          </a:p>
+        </p:txBody>
+      </p:sp>
     </p:spTree>
     <p:extLst>
       <p:ext uri="{BB962C8B-B14F-4D97-AF65-F5344CB8AC3E}">
-        <p14:creationId xmlns:p14="http://schemas.microsoft.com/office/powerpoint/2010/main" val="1175631114"/>
+        <p14:creationId xmlns:p14="http://schemas.microsoft.com/office/powerpoint/2010/main" val="4278430005"/>
       </p:ext>
     </p:extLst>
   </p:cSld>

</xml_diff>

<commit_message>
Last Commit Before Refactoring
</commit_message>
<xml_diff>
--- a/docs/Architectures.pptx
+++ b/docs/Architectures.pptx
@@ -203,7 +203,7 @@
           <a:p>
             <a:fld id="{692584DF-C865-4592-8ED7-B1F61CF9BAAD}" type="datetimeFigureOut">
               <a:rPr lang="en-GB" smtClean="0"/>
-              <a:t>26/08/2023</a:t>
+              <a:t>28/08/2023</a:t>
             </a:fld>
             <a:endParaRPr lang="en-GB"/>
           </a:p>
@@ -620,7 +620,7 @@
           <a:p>
             <a:fld id="{F329D50C-4BB7-4A90-83D6-4F26E5B1EE76}" type="datetimeFigureOut">
               <a:rPr lang="en-GB" smtClean="0"/>
-              <a:t>26/08/2023</a:t>
+              <a:t>28/08/2023</a:t>
             </a:fld>
             <a:endParaRPr lang="en-GB"/>
           </a:p>
@@ -820,7 +820,7 @@
           <a:p>
             <a:fld id="{F329D50C-4BB7-4A90-83D6-4F26E5B1EE76}" type="datetimeFigureOut">
               <a:rPr lang="en-GB" smtClean="0"/>
-              <a:t>26/08/2023</a:t>
+              <a:t>28/08/2023</a:t>
             </a:fld>
             <a:endParaRPr lang="en-GB"/>
           </a:p>
@@ -1030,7 +1030,7 @@
           <a:p>
             <a:fld id="{F329D50C-4BB7-4A90-83D6-4F26E5B1EE76}" type="datetimeFigureOut">
               <a:rPr lang="en-GB" smtClean="0"/>
-              <a:t>26/08/2023</a:t>
+              <a:t>28/08/2023</a:t>
             </a:fld>
             <a:endParaRPr lang="en-GB"/>
           </a:p>
@@ -1230,7 +1230,7 @@
           <a:p>
             <a:fld id="{F329D50C-4BB7-4A90-83D6-4F26E5B1EE76}" type="datetimeFigureOut">
               <a:rPr lang="en-GB" smtClean="0"/>
-              <a:t>26/08/2023</a:t>
+              <a:t>28/08/2023</a:t>
             </a:fld>
             <a:endParaRPr lang="en-GB"/>
           </a:p>
@@ -1506,7 +1506,7 @@
           <a:p>
             <a:fld id="{F329D50C-4BB7-4A90-83D6-4F26E5B1EE76}" type="datetimeFigureOut">
               <a:rPr lang="en-GB" smtClean="0"/>
-              <a:t>26/08/2023</a:t>
+              <a:t>28/08/2023</a:t>
             </a:fld>
             <a:endParaRPr lang="en-GB"/>
           </a:p>
@@ -1774,7 +1774,7 @@
           <a:p>
             <a:fld id="{F329D50C-4BB7-4A90-83D6-4F26E5B1EE76}" type="datetimeFigureOut">
               <a:rPr lang="en-GB" smtClean="0"/>
-              <a:t>26/08/2023</a:t>
+              <a:t>28/08/2023</a:t>
             </a:fld>
             <a:endParaRPr lang="en-GB"/>
           </a:p>
@@ -2189,7 +2189,7 @@
           <a:p>
             <a:fld id="{F329D50C-4BB7-4A90-83D6-4F26E5B1EE76}" type="datetimeFigureOut">
               <a:rPr lang="en-GB" smtClean="0"/>
-              <a:t>26/08/2023</a:t>
+              <a:t>28/08/2023</a:t>
             </a:fld>
             <a:endParaRPr lang="en-GB"/>
           </a:p>
@@ -2331,7 +2331,7 @@
           <a:p>
             <a:fld id="{F329D50C-4BB7-4A90-83D6-4F26E5B1EE76}" type="datetimeFigureOut">
               <a:rPr lang="en-GB" smtClean="0"/>
-              <a:t>26/08/2023</a:t>
+              <a:t>28/08/2023</a:t>
             </a:fld>
             <a:endParaRPr lang="en-GB"/>
           </a:p>
@@ -2444,7 +2444,7 @@
           <a:p>
             <a:fld id="{F329D50C-4BB7-4A90-83D6-4F26E5B1EE76}" type="datetimeFigureOut">
               <a:rPr lang="en-GB" smtClean="0"/>
-              <a:t>26/08/2023</a:t>
+              <a:t>28/08/2023</a:t>
             </a:fld>
             <a:endParaRPr lang="en-GB"/>
           </a:p>
@@ -2757,7 +2757,7 @@
           <a:p>
             <a:fld id="{F329D50C-4BB7-4A90-83D6-4F26E5B1EE76}" type="datetimeFigureOut">
               <a:rPr lang="en-GB" smtClean="0"/>
-              <a:t>26/08/2023</a:t>
+              <a:t>28/08/2023</a:t>
             </a:fld>
             <a:endParaRPr lang="en-GB"/>
           </a:p>
@@ -3046,7 +3046,7 @@
           <a:p>
             <a:fld id="{F329D50C-4BB7-4A90-83D6-4F26E5B1EE76}" type="datetimeFigureOut">
               <a:rPr lang="en-GB" smtClean="0"/>
-              <a:t>26/08/2023</a:t>
+              <a:t>28/08/2023</a:t>
             </a:fld>
             <a:endParaRPr lang="en-GB"/>
           </a:p>
@@ -3289,7 +3289,7 @@
           <a:p>
             <a:fld id="{F329D50C-4BB7-4A90-83D6-4F26E5B1EE76}" type="datetimeFigureOut">
               <a:rPr lang="en-GB" smtClean="0"/>
-              <a:t>26/08/2023</a:t>
+              <a:t>28/08/2023</a:t>
             </a:fld>
             <a:endParaRPr lang="en-GB"/>
           </a:p>
@@ -14023,7 +14023,7 @@
         </p:nvSpPr>
         <p:spPr>
           <a:xfrm rot="16200000">
-            <a:off x="8148058" y="2386536"/>
+            <a:off x="8694913" y="2400331"/>
             <a:ext cx="802881" cy="280868"/>
           </a:xfrm>
           <a:prstGeom prst="rect">
@@ -14085,7 +14085,7 @@
         </p:nvSpPr>
         <p:spPr>
           <a:xfrm rot="16200000">
-            <a:off x="7613264" y="3282386"/>
+            <a:off x="8160119" y="3296181"/>
             <a:ext cx="2705779" cy="387802"/>
           </a:xfrm>
           <a:prstGeom prst="rect">
@@ -14149,7 +14149,7 @@
         </p:nvCxnSpPr>
         <p:spPr>
           <a:xfrm>
-            <a:off x="9213445" y="3432385"/>
+            <a:off x="9760300" y="3446180"/>
             <a:ext cx="366081" cy="0"/>
           </a:xfrm>
           <a:prstGeom prst="straightConnector1">
@@ -14193,7 +14193,7 @@
         </p:nvCxnSpPr>
         <p:spPr>
           <a:xfrm>
-            <a:off x="8010629" y="3429000"/>
+            <a:off x="8479863" y="3459079"/>
             <a:ext cx="366081" cy="0"/>
           </a:xfrm>
           <a:prstGeom prst="straightConnector1">
@@ -14235,7 +14235,7 @@
         </p:nvSpPr>
         <p:spPr>
           <a:xfrm rot="16200000">
-            <a:off x="8116248" y="3305108"/>
+            <a:off x="8663103" y="3318903"/>
             <a:ext cx="866503" cy="280868"/>
           </a:xfrm>
           <a:prstGeom prst="rect">
@@ -14297,7 +14297,7 @@
         </p:nvSpPr>
         <p:spPr>
           <a:xfrm rot="16200000">
-            <a:off x="8121390" y="4255492"/>
+            <a:off x="8668245" y="4269287"/>
             <a:ext cx="866503" cy="280868"/>
           </a:xfrm>
           <a:prstGeom prst="rect">
@@ -14361,7 +14361,7 @@
         </p:nvCxnSpPr>
         <p:spPr>
           <a:xfrm>
-            <a:off x="8010629" y="2526970"/>
+            <a:off x="8479863" y="2557049"/>
             <a:ext cx="366081" cy="0"/>
           </a:xfrm>
           <a:prstGeom prst="straightConnector1">
@@ -14405,7 +14405,7 @@
         </p:nvCxnSpPr>
         <p:spPr>
           <a:xfrm>
-            <a:off x="8010629" y="4341269"/>
+            <a:off x="8479863" y="4371348"/>
             <a:ext cx="366081" cy="0"/>
           </a:xfrm>
           <a:prstGeom prst="straightConnector1">
@@ -14447,7 +14447,7 @@
         </p:nvSpPr>
         <p:spPr>
           <a:xfrm rot="16200000">
-            <a:off x="8490418" y="3282385"/>
+            <a:off x="9037273" y="3296180"/>
             <a:ext cx="2705779" cy="387802"/>
           </a:xfrm>
           <a:prstGeom prst="rect">
@@ -14613,8 +14613,8 @@
         </p:nvSpPr>
         <p:spPr>
           <a:xfrm rot="16200000">
-            <a:off x="8850538" y="384419"/>
-            <a:ext cx="440832" cy="1932507"/>
+            <a:off x="9123968" y="110990"/>
+            <a:ext cx="440832" cy="2479365"/>
           </a:xfrm>
           <a:prstGeom prst="rightBrace">
             <a:avLst>
@@ -14749,7 +14749,7 @@
         </p:nvSpPr>
         <p:spPr>
           <a:xfrm>
-            <a:off x="8409064" y="843605"/>
+            <a:off x="8666488" y="843605"/>
             <a:ext cx="1370720" cy="276999"/>
           </a:xfrm>
           <a:prstGeom prst="rect">
@@ -14772,6 +14772,71 @@
               <a:t>Analysis</a:t>
             </a:r>
             <a:endParaRPr lang="en-GB" sz="1200" b="1" dirty="0">
+              <a:latin typeface="Palatino Linotype" panose="02040502050505030304" pitchFamily="18" charset="0"/>
+            </a:endParaRPr>
+          </a:p>
+        </p:txBody>
+      </p:sp>
+      <p:sp>
+        <p:nvSpPr>
+          <p:cNvPr id="3" name="Trapezoid 2">
+            <a:extLst>
+              <a:ext uri="{FF2B5EF4-FFF2-40B4-BE49-F238E27FC236}">
+                <a16:creationId xmlns:a16="http://schemas.microsoft.com/office/drawing/2014/main" id="{25C727B8-2A6A-D44F-56E0-DF1AA8AD6D54}"/>
+              </a:ext>
+            </a:extLst>
+          </p:cNvPr>
+          <p:cNvSpPr/>
+          <p:nvPr/>
+        </p:nvSpPr>
+        <p:spPr>
+          <a:xfrm rot="5400000">
+            <a:off x="6889944" y="3310059"/>
+            <a:ext cx="2691985" cy="346254"/>
+          </a:xfrm>
+          <a:prstGeom prst="trapezoid">
+            <a:avLst>
+              <a:gd name="adj" fmla="val 45673"/>
+            </a:avLst>
+          </a:prstGeom>
+          <a:solidFill>
+            <a:schemeClr val="accent6">
+              <a:lumMod val="60000"/>
+              <a:lumOff val="40000"/>
+            </a:schemeClr>
+          </a:solidFill>
+          <a:ln>
+            <a:noFill/>
+          </a:ln>
+        </p:spPr>
+        <p:style>
+          <a:lnRef idx="2">
+            <a:schemeClr val="accent1">
+              <a:shade val="15000"/>
+            </a:schemeClr>
+          </a:lnRef>
+          <a:fillRef idx="1">
+            <a:schemeClr val="accent1"/>
+          </a:fillRef>
+          <a:effectRef idx="0">
+            <a:schemeClr val="accent1"/>
+          </a:effectRef>
+          <a:fontRef idx="minor">
+            <a:schemeClr val="lt1"/>
+          </a:fontRef>
+        </p:style>
+        <p:txBody>
+          <a:bodyPr rtlCol="0" anchor="ctr"/>
+          <a:lstStyle/>
+          <a:p>
+            <a:pPr algn="ctr"/>
+            <a:r>
+              <a:rPr lang="en-US" sz="1400" dirty="0">
+                <a:latin typeface="Palatino Linotype" panose="02040502050505030304" pitchFamily="18" charset="0"/>
+              </a:rPr>
+              <a:t>Encoder – Image to Molecule</a:t>
+            </a:r>
+            <a:endParaRPr lang="en-GB" sz="1400" dirty="0">
               <a:latin typeface="Palatino Linotype" panose="02040502050505030304" pitchFamily="18" charset="0"/>
             </a:endParaRPr>
           </a:p>

</xml_diff>